<commit_message>
Committing the final changes for LC Case Study
</commit_message>
<xml_diff>
--- a/LendingClubPPT.pptx
+++ b/LendingClubPPT.pptx
@@ -6828,7 +6828,7 @@
         <p:spPr>
           <a:xfrm>
             <a:off x="325873" y="2921168"/>
-            <a:ext cx="11424969" cy="1015663"/>
+            <a:ext cx="11424969" cy="2554545"/>
           </a:xfrm>
           <a:prstGeom prst="rect">
             <a:avLst/>
@@ -6849,6 +6849,26 @@
               <a:rPr lang="en-US" sz="2000" dirty="0"/>
               <a:t>understanding of risk analytics in banking and financial services and understand how data is used to minimize the risk of losing money while lending to customers.</a:t>
             </a:r>
+          </a:p>
+          <a:p>
+            <a:endParaRPr lang="en-US" sz="2000" dirty="0"/>
+          </a:p>
+          <a:p>
+            <a:r>
+              <a:rPr lang="en-US" sz="2000" b="0" dirty="0">
+                <a:solidFill>
+                  <a:srgbClr val="CCCCCC"/>
+                </a:solidFill>
+                <a:effectLst/>
+                <a:latin typeface="Consolas" panose="020B0609020204030204" pitchFamily="49" charset="0"/>
+              </a:rPr>
+              <a:t>Problem to be solved: Identify patterns based on the columns which would be used to reject/deny loans, reduce the loan amount or charge higher interest rate.</a:t>
+            </a:r>
+          </a:p>
+          <a:p>
+            <a:endParaRPr lang="en-US" sz="2000"/>
+          </a:p>
+          <a:p>
             <a:endParaRPr lang="en-IN" sz="2000" dirty="0"/>
           </a:p>
         </p:txBody>

</xml_diff>